<commit_message>
Added "set votes" to playlist table context menu + Server delete bug
Needed to add a new parameter named filename to each playlist element because else they can't be deleted without scanning every document because I changed the naming format/convention.
</commit_message>
<xml_diff>
--- a/ImageResources/ProjectFiles/icons.pptx
+++ b/ImageResources/ProjectFiles/icons.pptx
@@ -32,6 +32,7 @@
     <p:sldId id="286" r:id="rId26"/>
     <p:sldId id="288" r:id="rId27"/>
     <p:sldId id="289" r:id="rId28"/>
+    <p:sldId id="291" r:id="rId29"/>
   </p:sldIdLst>
   <p:sldSz cx="9525000" cy="9525000"/>
   <p:notesSz cx="6858000" cy="9144000"/>
@@ -287,7 +288,7 @@
                 </a:solidFill>
               </a:rPr>
               <a:pPr/>
-              <a:t>04.10.2017</a:t>
+              <a:t>15.10.2017</a:t>
             </a:fld>
             <a:endParaRPr lang="de-DE">
               <a:solidFill>
@@ -489,7 +490,7 @@
                 </a:solidFill>
               </a:rPr>
               <a:pPr/>
-              <a:t>04.10.2017</a:t>
+              <a:t>15.10.2017</a:t>
             </a:fld>
             <a:endParaRPr lang="de-DE">
               <a:solidFill>
@@ -701,7 +702,7 @@
                 </a:solidFill>
               </a:rPr>
               <a:pPr/>
-              <a:t>04.10.2017</a:t>
+              <a:t>15.10.2017</a:t>
             </a:fld>
             <a:endParaRPr lang="de-DE">
               <a:solidFill>
@@ -903,7 +904,7 @@
                 </a:solidFill>
               </a:rPr>
               <a:pPr/>
-              <a:t>04.10.2017</a:t>
+              <a:t>15.10.2017</a:t>
             </a:fld>
             <a:endParaRPr lang="de-DE">
               <a:solidFill>
@@ -1179,7 +1180,7 @@
                 </a:solidFill>
               </a:rPr>
               <a:pPr/>
-              <a:t>04.10.2017</a:t>
+              <a:t>15.10.2017</a:t>
             </a:fld>
             <a:endParaRPr lang="de-DE">
               <a:solidFill>
@@ -1443,7 +1444,7 @@
                 </a:solidFill>
               </a:rPr>
               <a:pPr/>
-              <a:t>04.10.2017</a:t>
+              <a:t>15.10.2017</a:t>
             </a:fld>
             <a:endParaRPr lang="de-DE">
               <a:solidFill>
@@ -1842,7 +1843,7 @@
                 </a:solidFill>
               </a:rPr>
               <a:pPr/>
-              <a:t>04.10.2017</a:t>
+              <a:t>15.10.2017</a:t>
             </a:fld>
             <a:endParaRPr lang="de-DE">
               <a:solidFill>
@@ -1992,7 +1993,7 @@
                 </a:solidFill>
               </a:rPr>
               <a:pPr/>
-              <a:t>04.10.2017</a:t>
+              <a:t>15.10.2017</a:t>
             </a:fld>
             <a:endParaRPr lang="de-DE">
               <a:solidFill>
@@ -2119,7 +2120,7 @@
                 </a:solidFill>
               </a:rPr>
               <a:pPr/>
-              <a:t>04.10.2017</a:t>
+              <a:t>15.10.2017</a:t>
             </a:fld>
             <a:endParaRPr lang="de-DE">
               <a:solidFill>
@@ -2428,7 +2429,7 @@
                 </a:solidFill>
               </a:rPr>
               <a:pPr/>
-              <a:t>04.10.2017</a:t>
+              <a:t>15.10.2017</a:t>
             </a:fld>
             <a:endParaRPr lang="de-DE">
               <a:solidFill>
@@ -2717,7 +2718,7 @@
                 </a:solidFill>
               </a:rPr>
               <a:pPr/>
-              <a:t>04.10.2017</a:t>
+              <a:t>15.10.2017</a:t>
             </a:fld>
             <a:endParaRPr lang="de-DE">
               <a:solidFill>
@@ -2968,7 +2969,7 @@
                 </a:solidFill>
               </a:rPr>
               <a:pPr defTabSz="403228"/>
-              <a:t>04.10.2017</a:t>
+              <a:t>15.10.2017</a:t>
             </a:fld>
             <a:endParaRPr lang="de-DE">
               <a:solidFill>
@@ -8995,6 +8996,78 @@
     <p:extLst>
       <p:ext uri="{BB962C8B-B14F-4D97-AF65-F5344CB8AC3E}">
         <p14:creationId xmlns:p14="http://schemas.microsoft.com/office/powerpoint/2010/main" val="2661112814"/>
+      </p:ext>
+    </p:extLst>
+  </p:cSld>
+  <p:clrMapOvr>
+    <a:masterClrMapping/>
+  </p:clrMapOvr>
+</p:sld>
+</file>
+
+<file path=ppt/slides/slide28.xml><?xml version="1.0" encoding="utf-8"?>
+<p:sld xmlns:a="http://schemas.openxmlformats.org/drawingml/2006/main" xmlns:r="http://schemas.openxmlformats.org/officeDocument/2006/relationships" xmlns:p="http://schemas.openxmlformats.org/presentationml/2006/main">
+  <p:cSld>
+    <p:spTree>
+      <p:nvGrpSpPr>
+        <p:cNvPr id="1" name=""/>
+        <p:cNvGrpSpPr/>
+        <p:nvPr/>
+      </p:nvGrpSpPr>
+      <p:grpSpPr>
+        <a:xfrm>
+          <a:off x="0" y="0"/>
+          <a:ext cx="0" cy="0"/>
+          <a:chOff x="0" y="0"/>
+          <a:chExt cx="0" cy="0"/>
+        </a:xfrm>
+      </p:grpSpPr>
+      <p:sp>
+        <p:nvSpPr>
+          <p:cNvPr id="4" name="Pfeil: nach oben 1"/>
+          <p:cNvSpPr/>
+          <p:nvPr/>
+        </p:nvSpPr>
+        <p:spPr>
+          <a:xfrm>
+            <a:off x="1138235" y="402212"/>
+            <a:ext cx="7248530" cy="8720576"/>
+          </a:xfrm>
+          <a:prstGeom prst="upArrow">
+            <a:avLst/>
+          </a:prstGeom>
+          <a:solidFill>
+            <a:schemeClr val="accent6"/>
+          </a:solidFill>
+          <a:effectLst/>
+        </p:spPr>
+        <p:style>
+          <a:lnRef idx="0">
+            <a:schemeClr val="accent6"/>
+          </a:lnRef>
+          <a:fillRef idx="3">
+            <a:schemeClr val="accent6"/>
+          </a:fillRef>
+          <a:effectRef idx="3">
+            <a:schemeClr val="accent6"/>
+          </a:effectRef>
+          <a:fontRef idx="minor">
+            <a:schemeClr val="lt1"/>
+          </a:fontRef>
+        </p:style>
+        <p:txBody>
+          <a:bodyPr rtlCol="0" anchor="ctr"/>
+          <a:lstStyle/>
+          <a:p>
+            <a:pPr algn="ctr"/>
+            <a:endParaRPr lang="de-DE" sz="1588"/>
+          </a:p>
+        </p:txBody>
+      </p:sp>
+    </p:spTree>
+    <p:extLst>
+      <p:ext uri="{BB962C8B-B14F-4D97-AF65-F5344CB8AC3E}">
+        <p14:creationId xmlns:p14="http://schemas.microsoft.com/office/powerpoint/2010/main" val="3281698758"/>
       </p:ext>
     </p:extLst>
   </p:cSld>

</xml_diff>